<commit_message>
Pause switch renamed as continue switch
</commit_message>
<xml_diff>
--- a/pictures/picovation.pptx
+++ b/pictures/picovation.pptx
@@ -113,14 +113,6 @@
     </p:ext>
   </p:extLst>
 </p:presentation>
-</file>
-
-<file path=ppt/revisionInfo.xml><?xml version="1.0" encoding="utf-8"?>
-<p1510:revInfo xmlns:a="http://schemas.openxmlformats.org/drawingml/2006/main" xmlns:r="http://schemas.openxmlformats.org/officeDocument/2006/relationships" xmlns:p1510="http://schemas.microsoft.com/office/powerpoint/2015/10/main">
-  <p1510:revLst>
-    <p1510:client id="{A16D4F0F-675A-4A2D-BB10-57FA28965D41}" v="4" dt="2023-04-11T14:17:46.639"/>
-  </p1510:revLst>
-</p1510:revInfo>
 </file>
 
 <file path=ppt/changesInfos/changesInfo1.xml><?xml version="1.0" encoding="utf-8"?>
@@ -534,6 +526,30 @@
             <ac:cxnSpMk id="17" creationId="{D6A596D3-F4B8-A645-B56B-D86C6B61147B}"/>
           </ac:cxnSpMkLst>
         </pc:cxnChg>
+      </pc:sldChg>
+    </pc:docChg>
+  </pc:docChgLst>
+  <pc:docChgLst>
+    <pc:chgData name="Barritault, Denis" userId="31958905-2920-4fef-84d2-b4723818abb1" providerId="ADAL" clId="{3E5FC0BF-581D-4F55-B275-1889E6CB0C43}"/>
+    <pc:docChg chg="modSld">
+      <pc:chgData name="Barritault, Denis" userId="31958905-2920-4fef-84d2-b4723818abb1" providerId="ADAL" clId="{3E5FC0BF-581D-4F55-B275-1889E6CB0C43}" dt="2023-08-25T16:16:56.068" v="7" actId="20577"/>
+      <pc:docMkLst>
+        <pc:docMk/>
+      </pc:docMkLst>
+      <pc:sldChg chg="modSp mod">
+        <pc:chgData name="Barritault, Denis" userId="31958905-2920-4fef-84d2-b4723818abb1" providerId="ADAL" clId="{3E5FC0BF-581D-4F55-B275-1889E6CB0C43}" dt="2023-08-25T16:16:56.068" v="7" actId="20577"/>
+        <pc:sldMkLst>
+          <pc:docMk/>
+          <pc:sldMk cId="833119427" sldId="257"/>
+        </pc:sldMkLst>
+        <pc:spChg chg="mod">
+          <ac:chgData name="Barritault, Denis" userId="31958905-2920-4fef-84d2-b4723818abb1" providerId="ADAL" clId="{3E5FC0BF-581D-4F55-B275-1889E6CB0C43}" dt="2023-08-25T16:16:56.068" v="7" actId="20577"/>
+          <ac:spMkLst>
+            <pc:docMk/>
+            <pc:sldMk cId="833119427" sldId="257"/>
+            <ac:spMk id="14" creationId="{9A9CC73D-7199-A419-8AF9-93CD470183C8}"/>
+          </ac:spMkLst>
+        </pc:spChg>
       </pc:sldChg>
     </pc:docChg>
   </pc:docChgLst>
@@ -4210,7 +4226,7 @@
           <p:spPr>
             <a:xfrm>
               <a:off x="2373549" y="2998145"/>
-              <a:ext cx="1840568" cy="307777"/>
+              <a:ext cx="2154757" cy="307777"/>
             </a:xfrm>
             <a:prstGeom prst="rect">
               <a:avLst/>
@@ -4224,8 +4240,8 @@
             <a:lstStyle/>
             <a:p>
               <a:r>
-                <a:rPr lang="fr-FR" sz="1400" dirty="0"/>
-                <a:t>PAUSE </a:t>
+                <a:rPr lang="fr-FR" sz="1400"/>
+                <a:t>CONTINUE </a:t>
               </a:r>
               <a:r>
                 <a:rPr lang="fr-FR" sz="1400" dirty="0" err="1"/>

</xml_diff>

<commit_message>
continue switch instead of pause switch
</commit_message>
<xml_diff>
--- a/pictures/picovation.pptx
+++ b/pictures/picovation.pptx
@@ -532,12 +532,12 @@
   <pc:docChgLst>
     <pc:chgData name="Barritault, Denis" userId="31958905-2920-4fef-84d2-b4723818abb1" providerId="ADAL" clId="{3E5FC0BF-581D-4F55-B275-1889E6CB0C43}"/>
     <pc:docChg chg="modSld">
-      <pc:chgData name="Barritault, Denis" userId="31958905-2920-4fef-84d2-b4723818abb1" providerId="ADAL" clId="{3E5FC0BF-581D-4F55-B275-1889E6CB0C43}" dt="2023-08-25T16:16:56.068" v="7" actId="20577"/>
+      <pc:chgData name="Barritault, Denis" userId="31958905-2920-4fef-84d2-b4723818abb1" providerId="ADAL" clId="{3E5FC0BF-581D-4F55-B275-1889E6CB0C43}" dt="2023-08-25T16:33:56.049" v="9" actId="1037"/>
       <pc:docMkLst>
         <pc:docMk/>
       </pc:docMkLst>
       <pc:sldChg chg="modSp mod">
-        <pc:chgData name="Barritault, Denis" userId="31958905-2920-4fef-84d2-b4723818abb1" providerId="ADAL" clId="{3E5FC0BF-581D-4F55-B275-1889E6CB0C43}" dt="2023-08-25T16:16:56.068" v="7" actId="20577"/>
+        <pc:chgData name="Barritault, Denis" userId="31958905-2920-4fef-84d2-b4723818abb1" providerId="ADAL" clId="{3E5FC0BF-581D-4F55-B275-1889E6CB0C43}" dt="2023-08-25T16:33:56.049" v="9" actId="1037"/>
         <pc:sldMkLst>
           <pc:docMk/>
           <pc:sldMk cId="833119427" sldId="257"/>
@@ -550,6 +550,14 @@
             <ac:spMk id="14" creationId="{9A9CC73D-7199-A419-8AF9-93CD470183C8}"/>
           </ac:spMkLst>
         </pc:spChg>
+        <pc:grpChg chg="mod">
+          <ac:chgData name="Barritault, Denis" userId="31958905-2920-4fef-84d2-b4723818abb1" providerId="ADAL" clId="{3E5FC0BF-581D-4F55-B275-1889E6CB0C43}" dt="2023-08-25T16:33:56.049" v="9" actId="1037"/>
+          <ac:grpSpMkLst>
+            <pc:docMk/>
+            <pc:sldMk cId="833119427" sldId="257"/>
+            <ac:grpSpMk id="20" creationId="{9519DA5A-832B-2BC9-31EA-FABCA4E853A8}"/>
+          </ac:grpSpMkLst>
+        </pc:grpChg>
       </pc:sldChg>
     </pc:docChg>
   </pc:docChgLst>

</xml_diff>

<commit_message>
update for wiki page
</commit_message>
<xml_diff>
--- a/pictures/picovation.pptx
+++ b/pictures/picovation.pptx
@@ -115,6 +115,14 @@
 </p:presentation>
 </file>
 
+<file path=ppt/revisionInfo.xml><?xml version="1.0" encoding="utf-8"?>
+<p1510:revInfo xmlns:a="http://schemas.openxmlformats.org/drawingml/2006/main" xmlns:r="http://schemas.openxmlformats.org/officeDocument/2006/relationships" xmlns:p1510="http://schemas.microsoft.com/office/powerpoint/2015/10/main">
+  <p1510:revLst>
+    <p1510:client id="{E6A1A1A2-A97F-4AED-8E43-69EDFDB61660}" v="2" dt="2023-08-28T14:16:23.176"/>
+  </p1510:revLst>
+</p1510:revInfo>
+</file>
+
 <file path=ppt/changesInfos/changesInfo1.xml><?xml version="1.0" encoding="utf-8"?>
 <pc:chgInfo xmlns:a="http://schemas.openxmlformats.org/drawingml/2006/main" xmlns:r="http://schemas.openxmlformats.org/officeDocument/2006/relationships" xmlns:ac="http://schemas.microsoft.com/office/drawing/2013/main/command" xmlns:pc="http://schemas.microsoft.com/office/powerpoint/2013/main/command">
   <pc:docChgLst>
@@ -422,6 +430,318 @@
             <ac:picMk id="3" creationId="{BD5BCC01-BFDD-1472-2034-6AF9C617B293}"/>
           </ac:picMkLst>
         </pc:picChg>
+      </pc:sldChg>
+    </pc:docChg>
+  </pc:docChgLst>
+  <pc:docChgLst>
+    <pc:chgData name="Barritault, Denis" userId="31958905-2920-4fef-84d2-b4723818abb1" providerId="ADAL" clId="{E6A1A1A2-A97F-4AED-8E43-69EDFDB61660}"/>
+    <pc:docChg chg="modSld">
+      <pc:chgData name="Barritault, Denis" userId="31958905-2920-4fef-84d2-b4723818abb1" providerId="ADAL" clId="{E6A1A1A2-A97F-4AED-8E43-69EDFDB61660}" dt="2023-08-28T14:16:23.175" v="21" actId="164"/>
+      <pc:docMkLst>
+        <pc:docMk/>
+      </pc:docMkLst>
+      <pc:sldChg chg="addSp delSp modSp mod">
+        <pc:chgData name="Barritault, Denis" userId="31958905-2920-4fef-84d2-b4723818abb1" providerId="ADAL" clId="{E6A1A1A2-A97F-4AED-8E43-69EDFDB61660}" dt="2023-08-28T14:16:23.175" v="21" actId="164"/>
+        <pc:sldMkLst>
+          <pc:docMk/>
+          <pc:sldMk cId="786923358" sldId="278"/>
+        </pc:sldMkLst>
+        <pc:spChg chg="mod">
+          <ac:chgData name="Barritault, Denis" userId="31958905-2920-4fef-84d2-b4723818abb1" providerId="ADAL" clId="{E6A1A1A2-A97F-4AED-8E43-69EDFDB61660}" dt="2023-08-28T14:16:15.274" v="20" actId="165"/>
+          <ac:spMkLst>
+            <pc:docMk/>
+            <pc:sldMk cId="786923358" sldId="278"/>
+            <ac:spMk id="2" creationId="{E9FE68F2-2B55-AD16-D266-D49618C9509C}"/>
+          </ac:spMkLst>
+        </pc:spChg>
+        <pc:spChg chg="mod topLvl">
+          <ac:chgData name="Barritault, Denis" userId="31958905-2920-4fef-84d2-b4723818abb1" providerId="ADAL" clId="{E6A1A1A2-A97F-4AED-8E43-69EDFDB61660}" dt="2023-08-28T14:16:23.175" v="21" actId="164"/>
+          <ac:spMkLst>
+            <pc:docMk/>
+            <pc:sldMk cId="786923358" sldId="278"/>
+            <ac:spMk id="3" creationId="{2CC2A0AF-83A1-0319-3344-D784F5CCB0FD}"/>
+          </ac:spMkLst>
+        </pc:spChg>
+        <pc:spChg chg="mod topLvl">
+          <ac:chgData name="Barritault, Denis" userId="31958905-2920-4fef-84d2-b4723818abb1" providerId="ADAL" clId="{E6A1A1A2-A97F-4AED-8E43-69EDFDB61660}" dt="2023-08-28T14:16:23.175" v="21" actId="164"/>
+          <ac:spMkLst>
+            <pc:docMk/>
+            <pc:sldMk cId="786923358" sldId="278"/>
+            <ac:spMk id="4" creationId="{71A78CAC-1F5A-18C3-9885-6106B30F5F40}"/>
+          </ac:spMkLst>
+        </pc:spChg>
+        <pc:spChg chg="mod topLvl">
+          <ac:chgData name="Barritault, Denis" userId="31958905-2920-4fef-84d2-b4723818abb1" providerId="ADAL" clId="{E6A1A1A2-A97F-4AED-8E43-69EDFDB61660}" dt="2023-08-28T14:16:23.175" v="21" actId="164"/>
+          <ac:spMkLst>
+            <pc:docMk/>
+            <pc:sldMk cId="786923358" sldId="278"/>
+            <ac:spMk id="5" creationId="{688DC559-6FB9-3CD6-C8C7-3BADA0DACDD6}"/>
+          </ac:spMkLst>
+        </pc:spChg>
+        <pc:spChg chg="mod">
+          <ac:chgData name="Barritault, Denis" userId="31958905-2920-4fef-84d2-b4723818abb1" providerId="ADAL" clId="{E6A1A1A2-A97F-4AED-8E43-69EDFDB61660}" dt="2023-08-28T14:16:15.274" v="20" actId="165"/>
+          <ac:spMkLst>
+            <pc:docMk/>
+            <pc:sldMk cId="786923358" sldId="278"/>
+            <ac:spMk id="7" creationId="{29E1EE90-C7F3-3FD2-A12C-3FB129F5CBFD}"/>
+          </ac:spMkLst>
+        </pc:spChg>
+        <pc:spChg chg="mod topLvl">
+          <ac:chgData name="Barritault, Denis" userId="31958905-2920-4fef-84d2-b4723818abb1" providerId="ADAL" clId="{E6A1A1A2-A97F-4AED-8E43-69EDFDB61660}" dt="2023-08-28T14:16:23.175" v="21" actId="164"/>
+          <ac:spMkLst>
+            <pc:docMk/>
+            <pc:sldMk cId="786923358" sldId="278"/>
+            <ac:spMk id="8" creationId="{EAD59BB8-CB83-B9A1-6DF8-2E4DC67292AC}"/>
+          </ac:spMkLst>
+        </pc:spChg>
+        <pc:spChg chg="mod topLvl">
+          <ac:chgData name="Barritault, Denis" userId="31958905-2920-4fef-84d2-b4723818abb1" providerId="ADAL" clId="{E6A1A1A2-A97F-4AED-8E43-69EDFDB61660}" dt="2023-08-28T14:16:23.175" v="21" actId="164"/>
+          <ac:spMkLst>
+            <pc:docMk/>
+            <pc:sldMk cId="786923358" sldId="278"/>
+            <ac:spMk id="9" creationId="{9C8A2A81-5E3A-B88E-DEDE-D1F221749143}"/>
+          </ac:spMkLst>
+        </pc:spChg>
+        <pc:spChg chg="mod">
+          <ac:chgData name="Barritault, Denis" userId="31958905-2920-4fef-84d2-b4723818abb1" providerId="ADAL" clId="{E6A1A1A2-A97F-4AED-8E43-69EDFDB61660}" dt="2023-08-28T14:16:15.274" v="20" actId="165"/>
+          <ac:spMkLst>
+            <pc:docMk/>
+            <pc:sldMk cId="786923358" sldId="278"/>
+            <ac:spMk id="104" creationId="{95265241-7F96-6AE5-5508-0E788C9D91B8}"/>
+          </ac:spMkLst>
+        </pc:spChg>
+        <pc:spChg chg="mod">
+          <ac:chgData name="Barritault, Denis" userId="31958905-2920-4fef-84d2-b4723818abb1" providerId="ADAL" clId="{E6A1A1A2-A97F-4AED-8E43-69EDFDB61660}" dt="2023-08-28T14:16:15.274" v="20" actId="165"/>
+          <ac:spMkLst>
+            <pc:docMk/>
+            <pc:sldMk cId="786923358" sldId="278"/>
+            <ac:spMk id="105" creationId="{BDD75742-CE75-8D1A-B77E-91F42575F968}"/>
+          </ac:spMkLst>
+        </pc:spChg>
+        <pc:spChg chg="mod">
+          <ac:chgData name="Barritault, Denis" userId="31958905-2920-4fef-84d2-b4723818abb1" providerId="ADAL" clId="{E6A1A1A2-A97F-4AED-8E43-69EDFDB61660}" dt="2023-08-28T14:16:15.274" v="20" actId="165"/>
+          <ac:spMkLst>
+            <pc:docMk/>
+            <pc:sldMk cId="786923358" sldId="278"/>
+            <ac:spMk id="106" creationId="{4586708E-F997-387D-B42A-B894A4F74F9C}"/>
+          </ac:spMkLst>
+        </pc:spChg>
+        <pc:spChg chg="mod">
+          <ac:chgData name="Barritault, Denis" userId="31958905-2920-4fef-84d2-b4723818abb1" providerId="ADAL" clId="{E6A1A1A2-A97F-4AED-8E43-69EDFDB61660}" dt="2023-08-28T14:16:15.274" v="20" actId="165"/>
+          <ac:spMkLst>
+            <pc:docMk/>
+            <pc:sldMk cId="786923358" sldId="278"/>
+            <ac:spMk id="107" creationId="{F0F4331F-529A-D377-48E7-FA6EB103E6DA}"/>
+          </ac:spMkLst>
+        </pc:spChg>
+        <pc:spChg chg="mod">
+          <ac:chgData name="Barritault, Denis" userId="31958905-2920-4fef-84d2-b4723818abb1" providerId="ADAL" clId="{E6A1A1A2-A97F-4AED-8E43-69EDFDB61660}" dt="2023-08-28T14:16:15.274" v="20" actId="165"/>
+          <ac:spMkLst>
+            <pc:docMk/>
+            <pc:sldMk cId="786923358" sldId="278"/>
+            <ac:spMk id="108" creationId="{FAD555BF-D423-E830-4B72-5ADC4922B79E}"/>
+          </ac:spMkLst>
+        </pc:spChg>
+        <pc:spChg chg="mod topLvl">
+          <ac:chgData name="Barritault, Denis" userId="31958905-2920-4fef-84d2-b4723818abb1" providerId="ADAL" clId="{E6A1A1A2-A97F-4AED-8E43-69EDFDB61660}" dt="2023-08-28T14:16:23.175" v="21" actId="164"/>
+          <ac:spMkLst>
+            <pc:docMk/>
+            <pc:sldMk cId="786923358" sldId="278"/>
+            <ac:spMk id="110" creationId="{BC1BD8EB-9BF0-7AD9-1722-C66531DCF952}"/>
+          </ac:spMkLst>
+        </pc:spChg>
+        <pc:spChg chg="mod topLvl">
+          <ac:chgData name="Barritault, Denis" userId="31958905-2920-4fef-84d2-b4723818abb1" providerId="ADAL" clId="{E6A1A1A2-A97F-4AED-8E43-69EDFDB61660}" dt="2023-08-28T14:16:23.175" v="21" actId="164"/>
+          <ac:spMkLst>
+            <pc:docMk/>
+            <pc:sldMk cId="786923358" sldId="278"/>
+            <ac:spMk id="112" creationId="{E9273ABC-7287-8163-B646-0B09471B7E20}"/>
+          </ac:spMkLst>
+        </pc:spChg>
+        <pc:spChg chg="mod topLvl">
+          <ac:chgData name="Barritault, Denis" userId="31958905-2920-4fef-84d2-b4723818abb1" providerId="ADAL" clId="{E6A1A1A2-A97F-4AED-8E43-69EDFDB61660}" dt="2023-08-28T14:16:23.175" v="21" actId="164"/>
+          <ac:spMkLst>
+            <pc:docMk/>
+            <pc:sldMk cId="786923358" sldId="278"/>
+            <ac:spMk id="113" creationId="{058129B2-37D0-5B6B-93E4-3882B41125B4}"/>
+          </ac:spMkLst>
+        </pc:spChg>
+        <pc:spChg chg="mod topLvl">
+          <ac:chgData name="Barritault, Denis" userId="31958905-2920-4fef-84d2-b4723818abb1" providerId="ADAL" clId="{E6A1A1A2-A97F-4AED-8E43-69EDFDB61660}" dt="2023-08-28T14:16:23.175" v="21" actId="164"/>
+          <ac:spMkLst>
+            <pc:docMk/>
+            <pc:sldMk cId="786923358" sldId="278"/>
+            <ac:spMk id="114" creationId="{ED0AF6E9-3AEB-9D4D-8790-D7EAF584E094}"/>
+          </ac:spMkLst>
+        </pc:spChg>
+        <pc:spChg chg="mod topLvl">
+          <ac:chgData name="Barritault, Denis" userId="31958905-2920-4fef-84d2-b4723818abb1" providerId="ADAL" clId="{E6A1A1A2-A97F-4AED-8E43-69EDFDB61660}" dt="2023-08-28T14:16:23.175" v="21" actId="164"/>
+          <ac:spMkLst>
+            <pc:docMk/>
+            <pc:sldMk cId="786923358" sldId="278"/>
+            <ac:spMk id="115" creationId="{08A0395F-D49A-546C-8EF9-B3D329BE88AE}"/>
+          </ac:spMkLst>
+        </pc:spChg>
+        <pc:spChg chg="mod topLvl">
+          <ac:chgData name="Barritault, Denis" userId="31958905-2920-4fef-84d2-b4723818abb1" providerId="ADAL" clId="{E6A1A1A2-A97F-4AED-8E43-69EDFDB61660}" dt="2023-08-28T14:16:23.175" v="21" actId="164"/>
+          <ac:spMkLst>
+            <pc:docMk/>
+            <pc:sldMk cId="786923358" sldId="278"/>
+            <ac:spMk id="116" creationId="{F34AEC4A-5213-58B6-4CAC-627848152573}"/>
+          </ac:spMkLst>
+        </pc:spChg>
+        <pc:spChg chg="mod topLvl">
+          <ac:chgData name="Barritault, Denis" userId="31958905-2920-4fef-84d2-b4723818abb1" providerId="ADAL" clId="{E6A1A1A2-A97F-4AED-8E43-69EDFDB61660}" dt="2023-08-28T14:16:23.175" v="21" actId="164"/>
+          <ac:spMkLst>
+            <pc:docMk/>
+            <pc:sldMk cId="786923358" sldId="278"/>
+            <ac:spMk id="117" creationId="{BA508A7E-4210-FAB0-FDB6-57C4724F5F97}"/>
+          </ac:spMkLst>
+        </pc:spChg>
+        <pc:spChg chg="mod topLvl">
+          <ac:chgData name="Barritault, Denis" userId="31958905-2920-4fef-84d2-b4723818abb1" providerId="ADAL" clId="{E6A1A1A2-A97F-4AED-8E43-69EDFDB61660}" dt="2023-08-28T14:16:23.175" v="21" actId="164"/>
+          <ac:spMkLst>
+            <pc:docMk/>
+            <pc:sldMk cId="786923358" sldId="278"/>
+            <ac:spMk id="130" creationId="{AB8C2D4B-71DE-B73A-7578-285A97148E75}"/>
+          </ac:spMkLst>
+        </pc:spChg>
+        <pc:spChg chg="mod topLvl">
+          <ac:chgData name="Barritault, Denis" userId="31958905-2920-4fef-84d2-b4723818abb1" providerId="ADAL" clId="{E6A1A1A2-A97F-4AED-8E43-69EDFDB61660}" dt="2023-08-28T14:16:23.175" v="21" actId="164"/>
+          <ac:spMkLst>
+            <pc:docMk/>
+            <pc:sldMk cId="786923358" sldId="278"/>
+            <ac:spMk id="135" creationId="{82FCA857-A076-CE40-CE71-6FD00C645390}"/>
+          </ac:spMkLst>
+        </pc:spChg>
+        <pc:spChg chg="mod topLvl">
+          <ac:chgData name="Barritault, Denis" userId="31958905-2920-4fef-84d2-b4723818abb1" providerId="ADAL" clId="{E6A1A1A2-A97F-4AED-8E43-69EDFDB61660}" dt="2023-08-28T14:16:23.175" v="21" actId="164"/>
+          <ac:spMkLst>
+            <pc:docMk/>
+            <pc:sldMk cId="786923358" sldId="278"/>
+            <ac:spMk id="152" creationId="{8AA6BF8E-FA34-C359-C8A8-D41D89060627}"/>
+          </ac:spMkLst>
+        </pc:spChg>
+        <pc:grpChg chg="del">
+          <ac:chgData name="Barritault, Denis" userId="31958905-2920-4fef-84d2-b4723818abb1" providerId="ADAL" clId="{E6A1A1A2-A97F-4AED-8E43-69EDFDB61660}" dt="2023-08-28T14:16:15.274" v="20" actId="165"/>
+          <ac:grpSpMkLst>
+            <pc:docMk/>
+            <pc:sldMk cId="786923358" sldId="278"/>
+            <ac:grpSpMk id="10" creationId="{0EE4D36D-15ED-39D7-EAEB-E96A96DE98B1}"/>
+          </ac:grpSpMkLst>
+        </pc:grpChg>
+        <pc:grpChg chg="add mod">
+          <ac:chgData name="Barritault, Denis" userId="31958905-2920-4fef-84d2-b4723818abb1" providerId="ADAL" clId="{E6A1A1A2-A97F-4AED-8E43-69EDFDB61660}" dt="2023-08-28T14:16:23.175" v="21" actId="164"/>
+          <ac:grpSpMkLst>
+            <pc:docMk/>
+            <pc:sldMk cId="786923358" sldId="278"/>
+            <ac:grpSpMk id="11" creationId="{535528E7-DD41-99DF-9E89-D2B5AB4EA38D}"/>
+          </ac:grpSpMkLst>
+        </pc:grpChg>
+        <pc:grpChg chg="mod topLvl">
+          <ac:chgData name="Barritault, Denis" userId="31958905-2920-4fef-84d2-b4723818abb1" providerId="ADAL" clId="{E6A1A1A2-A97F-4AED-8E43-69EDFDB61660}" dt="2023-08-28T14:16:15.274" v="20" actId="165"/>
+          <ac:grpSpMkLst>
+            <pc:docMk/>
+            <pc:sldMk cId="786923358" sldId="278"/>
+            <ac:grpSpMk id="118" creationId="{75275685-0263-039A-AD30-245575BC96B1}"/>
+          </ac:grpSpMkLst>
+        </pc:grpChg>
+        <pc:cxnChg chg="mod">
+          <ac:chgData name="Barritault, Denis" userId="31958905-2920-4fef-84d2-b4723818abb1" providerId="ADAL" clId="{E6A1A1A2-A97F-4AED-8E43-69EDFDB61660}" dt="2023-08-28T14:16:15.274" v="20" actId="165"/>
+          <ac:cxnSpMkLst>
+            <pc:docMk/>
+            <pc:sldMk cId="786923358" sldId="278"/>
+            <ac:cxnSpMk id="6" creationId="{C037CDB5-16FA-748A-25FA-E9D1D1387193}"/>
+          </ac:cxnSpMkLst>
+        </pc:cxnChg>
+        <pc:cxnChg chg="mod topLvl">
+          <ac:chgData name="Barritault, Denis" userId="31958905-2920-4fef-84d2-b4723818abb1" providerId="ADAL" clId="{E6A1A1A2-A97F-4AED-8E43-69EDFDB61660}" dt="2023-08-28T14:16:23.175" v="21" actId="164"/>
+          <ac:cxnSpMkLst>
+            <pc:docMk/>
+            <pc:sldMk cId="786923358" sldId="278"/>
+            <ac:cxnSpMk id="111" creationId="{A5AFF41B-FDE4-431A-C8B7-29071CB565F0}"/>
+          </ac:cxnSpMkLst>
+        </pc:cxnChg>
+        <pc:cxnChg chg="mod topLvl">
+          <ac:chgData name="Barritault, Denis" userId="31958905-2920-4fef-84d2-b4723818abb1" providerId="ADAL" clId="{E6A1A1A2-A97F-4AED-8E43-69EDFDB61660}" dt="2023-08-28T14:16:23.175" v="21" actId="164"/>
+          <ac:cxnSpMkLst>
+            <pc:docMk/>
+            <pc:sldMk cId="786923358" sldId="278"/>
+            <ac:cxnSpMk id="122" creationId="{68C040E0-9B02-67D6-0BD8-FEC7D3273571}"/>
+          </ac:cxnSpMkLst>
+        </pc:cxnChg>
+        <pc:cxnChg chg="mod topLvl">
+          <ac:chgData name="Barritault, Denis" userId="31958905-2920-4fef-84d2-b4723818abb1" providerId="ADAL" clId="{E6A1A1A2-A97F-4AED-8E43-69EDFDB61660}" dt="2023-08-28T14:16:23.175" v="21" actId="164"/>
+          <ac:cxnSpMkLst>
+            <pc:docMk/>
+            <pc:sldMk cId="786923358" sldId="278"/>
+            <ac:cxnSpMk id="125" creationId="{9B97B64C-8EC1-6AA0-86D3-4F7BD33E5AF9}"/>
+          </ac:cxnSpMkLst>
+        </pc:cxnChg>
+        <pc:cxnChg chg="mod topLvl">
+          <ac:chgData name="Barritault, Denis" userId="31958905-2920-4fef-84d2-b4723818abb1" providerId="ADAL" clId="{E6A1A1A2-A97F-4AED-8E43-69EDFDB61660}" dt="2023-08-28T14:16:23.175" v="21" actId="164"/>
+          <ac:cxnSpMkLst>
+            <pc:docMk/>
+            <pc:sldMk cId="786923358" sldId="278"/>
+            <ac:cxnSpMk id="127" creationId="{BCE4D87B-D3A3-CB88-DD26-ADD7DED50EB1}"/>
+          </ac:cxnSpMkLst>
+        </pc:cxnChg>
+        <pc:cxnChg chg="mod topLvl">
+          <ac:chgData name="Barritault, Denis" userId="31958905-2920-4fef-84d2-b4723818abb1" providerId="ADAL" clId="{E6A1A1A2-A97F-4AED-8E43-69EDFDB61660}" dt="2023-08-28T14:16:23.175" v="21" actId="164"/>
+          <ac:cxnSpMkLst>
+            <pc:docMk/>
+            <pc:sldMk cId="786923358" sldId="278"/>
+            <ac:cxnSpMk id="129" creationId="{D0569A42-CDE2-39C5-5C1E-26A63059A944}"/>
+          </ac:cxnSpMkLst>
+        </pc:cxnChg>
+        <pc:cxnChg chg="mod topLvl">
+          <ac:chgData name="Barritault, Denis" userId="31958905-2920-4fef-84d2-b4723818abb1" providerId="ADAL" clId="{E6A1A1A2-A97F-4AED-8E43-69EDFDB61660}" dt="2023-08-28T14:16:23.175" v="21" actId="164"/>
+          <ac:cxnSpMkLst>
+            <pc:docMk/>
+            <pc:sldMk cId="786923358" sldId="278"/>
+            <ac:cxnSpMk id="132" creationId="{FE996826-B33A-7781-841C-399A6E254E11}"/>
+          </ac:cxnSpMkLst>
+        </pc:cxnChg>
+        <pc:cxnChg chg="mod topLvl">
+          <ac:chgData name="Barritault, Denis" userId="31958905-2920-4fef-84d2-b4723818abb1" providerId="ADAL" clId="{E6A1A1A2-A97F-4AED-8E43-69EDFDB61660}" dt="2023-08-28T14:16:23.175" v="21" actId="164"/>
+          <ac:cxnSpMkLst>
+            <pc:docMk/>
+            <pc:sldMk cId="786923358" sldId="278"/>
+            <ac:cxnSpMk id="140" creationId="{BCB19E50-0B80-E7BF-0589-6E0B4204130C}"/>
+          </ac:cxnSpMkLst>
+        </pc:cxnChg>
+        <pc:cxnChg chg="mod topLvl">
+          <ac:chgData name="Barritault, Denis" userId="31958905-2920-4fef-84d2-b4723818abb1" providerId="ADAL" clId="{E6A1A1A2-A97F-4AED-8E43-69EDFDB61660}" dt="2023-08-28T14:16:23.175" v="21" actId="164"/>
+          <ac:cxnSpMkLst>
+            <pc:docMk/>
+            <pc:sldMk cId="786923358" sldId="278"/>
+            <ac:cxnSpMk id="142" creationId="{6F378310-84F1-7AEF-7E83-7D1EA1DB98F8}"/>
+          </ac:cxnSpMkLst>
+        </pc:cxnChg>
+        <pc:cxnChg chg="mod topLvl">
+          <ac:chgData name="Barritault, Denis" userId="31958905-2920-4fef-84d2-b4723818abb1" providerId="ADAL" clId="{E6A1A1A2-A97F-4AED-8E43-69EDFDB61660}" dt="2023-08-28T14:16:23.175" v="21" actId="164"/>
+          <ac:cxnSpMkLst>
+            <pc:docMk/>
+            <pc:sldMk cId="786923358" sldId="278"/>
+            <ac:cxnSpMk id="144" creationId="{A4A25379-98FC-01F5-025B-5ED4462DDFBC}"/>
+          </ac:cxnSpMkLst>
+        </pc:cxnChg>
+        <pc:cxnChg chg="mod topLvl">
+          <ac:chgData name="Barritault, Denis" userId="31958905-2920-4fef-84d2-b4723818abb1" providerId="ADAL" clId="{E6A1A1A2-A97F-4AED-8E43-69EDFDB61660}" dt="2023-08-28T14:16:23.175" v="21" actId="164"/>
+          <ac:cxnSpMkLst>
+            <pc:docMk/>
+            <pc:sldMk cId="786923358" sldId="278"/>
+            <ac:cxnSpMk id="146" creationId="{81F35E2E-2154-2A99-18EF-CDA6D106DC39}"/>
+          </ac:cxnSpMkLst>
+        </pc:cxnChg>
+        <pc:cxnChg chg="mod topLvl">
+          <ac:chgData name="Barritault, Denis" userId="31958905-2920-4fef-84d2-b4723818abb1" providerId="ADAL" clId="{E6A1A1A2-A97F-4AED-8E43-69EDFDB61660}" dt="2023-08-28T14:16:23.175" v="21" actId="164"/>
+          <ac:cxnSpMkLst>
+            <pc:docMk/>
+            <pc:sldMk cId="786923358" sldId="278"/>
+            <ac:cxnSpMk id="151" creationId="{B3616D77-D44E-59B1-E2FA-78C2A48C6B85}"/>
+          </ac:cxnSpMkLst>
+        </pc:cxnChg>
       </pc:sldChg>
     </pc:docChg>
   </pc:docChgLst>
@@ -713,7 +1033,7 @@
           <a:p>
             <a:fld id="{F49253E0-06C5-4072-9C84-F6FE16A4B26B}" type="datetimeFigureOut">
               <a:rPr lang="en-GB" smtClean="0"/>
-              <a:t>25/08/2023</a:t>
+              <a:t>28/08/2023</a:t>
             </a:fld>
             <a:endParaRPr lang="en-GB"/>
           </a:p>
@@ -913,7 +1233,7 @@
           <a:p>
             <a:fld id="{F49253E0-06C5-4072-9C84-F6FE16A4B26B}" type="datetimeFigureOut">
               <a:rPr lang="en-GB" smtClean="0"/>
-              <a:t>25/08/2023</a:t>
+              <a:t>28/08/2023</a:t>
             </a:fld>
             <a:endParaRPr lang="en-GB"/>
           </a:p>
@@ -1123,7 +1443,7 @@
           <a:p>
             <a:fld id="{F49253E0-06C5-4072-9C84-F6FE16A4B26B}" type="datetimeFigureOut">
               <a:rPr lang="en-GB" smtClean="0"/>
-              <a:t>25/08/2023</a:t>
+              <a:t>28/08/2023</a:t>
             </a:fld>
             <a:endParaRPr lang="en-GB"/>
           </a:p>
@@ -1323,7 +1643,7 @@
           <a:p>
             <a:fld id="{F49253E0-06C5-4072-9C84-F6FE16A4B26B}" type="datetimeFigureOut">
               <a:rPr lang="en-GB" smtClean="0"/>
-              <a:t>25/08/2023</a:t>
+              <a:t>28/08/2023</a:t>
             </a:fld>
             <a:endParaRPr lang="en-GB"/>
           </a:p>
@@ -1599,7 +1919,7 @@
           <a:p>
             <a:fld id="{F49253E0-06C5-4072-9C84-F6FE16A4B26B}" type="datetimeFigureOut">
               <a:rPr lang="en-GB" smtClean="0"/>
-              <a:t>25/08/2023</a:t>
+              <a:t>28/08/2023</a:t>
             </a:fld>
             <a:endParaRPr lang="en-GB"/>
           </a:p>
@@ -1867,7 +2187,7 @@
           <a:p>
             <a:fld id="{F49253E0-06C5-4072-9C84-F6FE16A4B26B}" type="datetimeFigureOut">
               <a:rPr lang="en-GB" smtClean="0"/>
-              <a:t>25/08/2023</a:t>
+              <a:t>28/08/2023</a:t>
             </a:fld>
             <a:endParaRPr lang="en-GB"/>
           </a:p>
@@ -2282,7 +2602,7 @@
           <a:p>
             <a:fld id="{F49253E0-06C5-4072-9C84-F6FE16A4B26B}" type="datetimeFigureOut">
               <a:rPr lang="en-GB" smtClean="0"/>
-              <a:t>25/08/2023</a:t>
+              <a:t>28/08/2023</a:t>
             </a:fld>
             <a:endParaRPr lang="en-GB"/>
           </a:p>
@@ -2424,7 +2744,7 @@
           <a:p>
             <a:fld id="{F49253E0-06C5-4072-9C84-F6FE16A4B26B}" type="datetimeFigureOut">
               <a:rPr lang="en-GB" smtClean="0"/>
-              <a:t>25/08/2023</a:t>
+              <a:t>28/08/2023</a:t>
             </a:fld>
             <a:endParaRPr lang="en-GB"/>
           </a:p>
@@ -2537,7 +2857,7 @@
           <a:p>
             <a:fld id="{F49253E0-06C5-4072-9C84-F6FE16A4B26B}" type="datetimeFigureOut">
               <a:rPr lang="en-GB" smtClean="0"/>
-              <a:t>25/08/2023</a:t>
+              <a:t>28/08/2023</a:t>
             </a:fld>
             <a:endParaRPr lang="en-GB"/>
           </a:p>
@@ -2850,7 +3170,7 @@
           <a:p>
             <a:fld id="{F49253E0-06C5-4072-9C84-F6FE16A4B26B}" type="datetimeFigureOut">
               <a:rPr lang="en-GB" smtClean="0"/>
-              <a:t>25/08/2023</a:t>
+              <a:t>28/08/2023</a:t>
             </a:fld>
             <a:endParaRPr lang="en-GB"/>
           </a:p>
@@ -3139,7 +3459,7 @@
           <a:p>
             <a:fld id="{F49253E0-06C5-4072-9C84-F6FE16A4B26B}" type="datetimeFigureOut">
               <a:rPr lang="en-GB" smtClean="0"/>
-              <a:t>25/08/2023</a:t>
+              <a:t>28/08/2023</a:t>
             </a:fld>
             <a:endParaRPr lang="en-GB"/>
           </a:p>
@@ -3382,7 +3702,7 @@
           <a:p>
             <a:fld id="{F49253E0-06C5-4072-9C84-F6FE16A4B26B}" type="datetimeFigureOut">
               <a:rPr lang="en-GB" smtClean="0"/>
-              <a:t>25/08/2023</a:t>
+              <a:t>28/08/2023</a:t>
             </a:fld>
             <a:endParaRPr lang="en-GB"/>
           </a:p>
@@ -4567,10 +4887,10 @@
       </p:grpSpPr>
       <p:grpSp>
         <p:nvGrpSpPr>
-          <p:cNvPr id="10" name="Group 9">
+          <p:cNvPr id="118" name="Group 117">
             <a:extLst>
               <a:ext uri="{FF2B5EF4-FFF2-40B4-BE49-F238E27FC236}">
-                <a16:creationId xmlns:a16="http://schemas.microsoft.com/office/drawing/2014/main" id="{0EE4D36D-15ED-39D7-EAEB-E96A96DE98B1}"/>
+                <a16:creationId xmlns:a16="http://schemas.microsoft.com/office/drawing/2014/main" id="{75275685-0263-039A-AD30-245575BC96B1}"/>
               </a:ext>
             </a:extLst>
           </p:cNvPr>
@@ -4580,510 +4900,510 @@
         <p:grpSpPr>
           <a:xfrm>
             <a:off x="1509381" y="355819"/>
-            <a:ext cx="7396079" cy="4627172"/>
+            <a:ext cx="7396079" cy="1089328"/>
             <a:chOff x="1509381" y="355819"/>
-            <a:chExt cx="7396079" cy="4627172"/>
+            <a:chExt cx="7396079" cy="1089328"/>
           </a:xfrm>
         </p:grpSpPr>
-        <p:grpSp>
-          <p:nvGrpSpPr>
-            <p:cNvPr id="118" name="Group 117">
+        <p:sp>
+          <p:nvSpPr>
+            <p:cNvPr id="2" name="Rectangle 1">
               <a:extLst>
                 <a:ext uri="{FF2B5EF4-FFF2-40B4-BE49-F238E27FC236}">
-                  <a16:creationId xmlns:a16="http://schemas.microsoft.com/office/drawing/2014/main" id="{75275685-0263-039A-AD30-245575BC96B1}"/>
+                  <a16:creationId xmlns:a16="http://schemas.microsoft.com/office/drawing/2014/main" id="{E9FE68F2-2B55-AD16-D266-D49618C9509C}"/>
                 </a:ext>
               </a:extLst>
             </p:cNvPr>
-            <p:cNvGrpSpPr/>
+            <p:cNvSpPr/>
             <p:nvPr/>
-          </p:nvGrpSpPr>
-          <p:grpSpPr>
+          </p:nvSpPr>
+          <p:spPr>
             <a:xfrm>
-              <a:off x="1509381" y="355819"/>
-              <a:ext cx="7396079" cy="1089328"/>
-              <a:chOff x="1509381" y="355819"/>
-              <a:chExt cx="7396079" cy="1089328"/>
+              <a:off x="3289759" y="355819"/>
+              <a:ext cx="5615701" cy="1089328"/>
             </a:xfrm>
-          </p:grpSpPr>
-          <p:sp>
-            <p:nvSpPr>
-              <p:cNvPr id="2" name="Rectangle 1">
-                <a:extLst>
-                  <a:ext uri="{FF2B5EF4-FFF2-40B4-BE49-F238E27FC236}">
-                    <a16:creationId xmlns:a16="http://schemas.microsoft.com/office/drawing/2014/main" id="{E9FE68F2-2B55-AD16-D266-D49618C9509C}"/>
-                  </a:ext>
-                </a:extLst>
-              </p:cNvPr>
-              <p:cNvSpPr/>
-              <p:nvPr/>
-            </p:nvSpPr>
-            <p:spPr>
-              <a:xfrm>
-                <a:off x="3289759" y="355819"/>
-                <a:ext cx="5615701" cy="1089328"/>
-              </a:xfrm>
-              <a:prstGeom prst="rect">
-                <a:avLst/>
-              </a:prstGeom>
-              <a:noFill/>
-            </p:spPr>
-            <p:style>
-              <a:lnRef idx="2">
-                <a:schemeClr val="accent1">
-                  <a:shade val="15000"/>
-                </a:schemeClr>
-              </a:lnRef>
-              <a:fillRef idx="1">
-                <a:schemeClr val="accent1"/>
-              </a:fillRef>
-              <a:effectRef idx="0">
-                <a:schemeClr val="accent1"/>
-              </a:effectRef>
-              <a:fontRef idx="minor">
-                <a:schemeClr val="lt1"/>
-              </a:fontRef>
-            </p:style>
-            <p:txBody>
-              <a:bodyPr rtlCol="0" anchor="ctr"/>
-              <a:lstStyle/>
-              <a:p>
-                <a:pPr algn="ctr"/>
-                <a:endParaRPr lang="en-GB" sz="800">
+            <a:prstGeom prst="rect">
+              <a:avLst/>
+            </a:prstGeom>
+            <a:noFill/>
+          </p:spPr>
+          <p:style>
+            <a:lnRef idx="2">
+              <a:schemeClr val="accent1">
+                <a:shade val="15000"/>
+              </a:schemeClr>
+            </a:lnRef>
+            <a:fillRef idx="1">
+              <a:schemeClr val="accent1"/>
+            </a:fillRef>
+            <a:effectRef idx="0">
+              <a:schemeClr val="accent1"/>
+            </a:effectRef>
+            <a:fontRef idx="minor">
+              <a:schemeClr val="lt1"/>
+            </a:fontRef>
+          </p:style>
+          <p:txBody>
+            <a:bodyPr rtlCol="0" anchor="ctr"/>
+            <a:lstStyle/>
+            <a:p>
+              <a:pPr algn="ctr"/>
+              <a:endParaRPr lang="en-GB" sz="800">
+                <a:solidFill>
+                  <a:schemeClr val="tx1"/>
+                </a:solidFill>
+              </a:endParaRPr>
+            </a:p>
+          </p:txBody>
+        </p:sp>
+        <p:cxnSp>
+          <p:nvCxnSpPr>
+            <p:cNvPr id="6" name="Straight Arrow Connector 5">
+              <a:extLst>
+                <a:ext uri="{FF2B5EF4-FFF2-40B4-BE49-F238E27FC236}">
+                  <a16:creationId xmlns:a16="http://schemas.microsoft.com/office/drawing/2014/main" id="{C037CDB5-16FA-748A-25FA-E9D1D1387193}"/>
+                </a:ext>
+              </a:extLst>
+            </p:cNvPr>
+            <p:cNvCxnSpPr>
+              <a:cxnSpLocks/>
+              <a:stCxn id="2" idx="1"/>
+            </p:cNvCxnSpPr>
+            <p:nvPr/>
+          </p:nvCxnSpPr>
+          <p:spPr>
+            <a:xfrm flipH="1">
+              <a:off x="2337684" y="900483"/>
+              <a:ext cx="952075" cy="0"/>
+            </a:xfrm>
+            <a:prstGeom prst="straightConnector1">
+              <a:avLst/>
+            </a:prstGeom>
+            <a:ln w="28575">
+              <a:solidFill>
+                <a:schemeClr val="tx1"/>
+              </a:solidFill>
+              <a:tailEnd type="triangle"/>
+            </a:ln>
+          </p:spPr>
+          <p:style>
+            <a:lnRef idx="1">
+              <a:schemeClr val="accent1"/>
+            </a:lnRef>
+            <a:fillRef idx="0">
+              <a:schemeClr val="accent1"/>
+            </a:fillRef>
+            <a:effectRef idx="0">
+              <a:schemeClr val="accent1"/>
+            </a:effectRef>
+            <a:fontRef idx="minor">
+              <a:schemeClr val="tx1"/>
+            </a:fontRef>
+          </p:style>
+        </p:cxnSp>
+        <p:sp>
+          <p:nvSpPr>
+            <p:cNvPr id="7" name="TextBox 113">
+              <a:extLst>
+                <a:ext uri="{FF2B5EF4-FFF2-40B4-BE49-F238E27FC236}">
+                  <a16:creationId xmlns:a16="http://schemas.microsoft.com/office/drawing/2014/main" id="{29E1EE90-C7F3-3FD2-A12C-3FB129F5CBFD}"/>
+                </a:ext>
+              </a:extLst>
+            </p:cNvPr>
+            <p:cNvSpPr txBox="1"/>
+            <p:nvPr/>
+          </p:nvSpPr>
+          <p:spPr>
+            <a:xfrm>
+              <a:off x="1509381" y="508403"/>
+              <a:ext cx="1707840" cy="738664"/>
+            </a:xfrm>
+            <a:prstGeom prst="rect">
+              <a:avLst/>
+            </a:prstGeom>
+            <a:noFill/>
+          </p:spPr>
+          <p:txBody>
+            <a:bodyPr wrap="none" rtlCol="0">
+              <a:spAutoFit/>
+            </a:bodyPr>
+            <a:lstStyle/>
+            <a:p>
+              <a:r>
+                <a:rPr lang="fr-FR" sz="1400" dirty="0"/>
+                <a:t>To USB slave</a:t>
+              </a:r>
+              <a:br>
+                <a:rPr lang="fr-FR" sz="1400" dirty="0"/>
+              </a:br>
+              <a:r>
+                <a:rPr lang="fr-FR" sz="1400" dirty="0" err="1"/>
+                <a:t>device</a:t>
+              </a:r>
+              <a:br>
+                <a:rPr lang="fr-FR" sz="1400" dirty="0"/>
+              </a:br>
+              <a:r>
+                <a:rPr lang="fr-FR" sz="1400" dirty="0"/>
+                <a:t>(</a:t>
+              </a:r>
+              <a:r>
+                <a:rPr lang="fr-FR" sz="1400" dirty="0" err="1"/>
+                <a:t>eg</a:t>
+              </a:r>
+              <a:r>
+                <a:rPr lang="fr-FR" sz="1400" dirty="0"/>
+                <a:t>. Novation circuit)</a:t>
+              </a:r>
+            </a:p>
+          </p:txBody>
+        </p:sp>
+        <p:sp>
+          <p:nvSpPr>
+            <p:cNvPr id="104" name="Oval 103">
+              <a:extLst>
+                <a:ext uri="{FF2B5EF4-FFF2-40B4-BE49-F238E27FC236}">
+                  <a16:creationId xmlns:a16="http://schemas.microsoft.com/office/drawing/2014/main" id="{95265241-7F96-6AE5-5508-0E788C9D91B8}"/>
+                </a:ext>
+              </a:extLst>
+            </p:cNvPr>
+            <p:cNvSpPr/>
+            <p:nvPr/>
+          </p:nvSpPr>
+          <p:spPr>
+            <a:xfrm>
+              <a:off x="4591879" y="518820"/>
+              <a:ext cx="779228" cy="779228"/>
+            </a:xfrm>
+            <a:prstGeom prst="ellipse">
+              <a:avLst/>
+            </a:prstGeom>
+            <a:noFill/>
+          </p:spPr>
+          <p:style>
+            <a:lnRef idx="2">
+              <a:schemeClr val="accent1">
+                <a:shade val="15000"/>
+              </a:schemeClr>
+            </a:lnRef>
+            <a:fillRef idx="1">
+              <a:schemeClr val="accent1"/>
+            </a:fillRef>
+            <a:effectRef idx="0">
+              <a:schemeClr val="accent1"/>
+            </a:effectRef>
+            <a:fontRef idx="minor">
+              <a:schemeClr val="lt1"/>
+            </a:fontRef>
+          </p:style>
+          <p:txBody>
+            <a:bodyPr rtlCol="0" anchor="ctr"/>
+            <a:lstStyle/>
+            <a:p>
+              <a:pPr algn="ctr"/>
+              <a:r>
+                <a:rPr lang="fr-FR" sz="800" dirty="0">
                   <a:solidFill>
                     <a:schemeClr val="tx1"/>
                   </a:solidFill>
-                </a:endParaRPr>
-              </a:p>
-            </p:txBody>
-          </p:sp>
-          <p:cxnSp>
-            <p:nvCxnSpPr>
-              <p:cNvPr id="6" name="Straight Arrow Connector 5">
-                <a:extLst>
-                  <a:ext uri="{FF2B5EF4-FFF2-40B4-BE49-F238E27FC236}">
-                    <a16:creationId xmlns:a16="http://schemas.microsoft.com/office/drawing/2014/main" id="{C037CDB5-16FA-748A-25FA-E9D1D1387193}"/>
-                  </a:ext>
-                </a:extLst>
-              </p:cNvPr>
-              <p:cNvCxnSpPr>
-                <a:cxnSpLocks/>
-                <a:stCxn id="2" idx="1"/>
-              </p:cNvCxnSpPr>
-              <p:nvPr/>
-            </p:nvCxnSpPr>
-            <p:spPr>
-              <a:xfrm flipH="1">
-                <a:off x="2337684" y="900483"/>
-                <a:ext cx="952075" cy="0"/>
-              </a:xfrm>
-              <a:prstGeom prst="straightConnector1">
-                <a:avLst/>
-              </a:prstGeom>
-              <a:ln w="28575">
+                </a:rPr>
+                <a:t>CONTINUE / STOP</a:t>
+              </a:r>
+              <a:endParaRPr lang="en-GB" sz="800" dirty="0">
                 <a:solidFill>
                   <a:schemeClr val="tx1"/>
                 </a:solidFill>
-                <a:tailEnd type="triangle"/>
-              </a:ln>
-            </p:spPr>
-            <p:style>
-              <a:lnRef idx="1">
-                <a:schemeClr val="accent1"/>
-              </a:lnRef>
-              <a:fillRef idx="0">
-                <a:schemeClr val="accent1"/>
-              </a:fillRef>
-              <a:effectRef idx="0">
-                <a:schemeClr val="accent1"/>
-              </a:effectRef>
-              <a:fontRef idx="minor">
-                <a:schemeClr val="tx1"/>
-              </a:fontRef>
-            </p:style>
-          </p:cxnSp>
-          <p:sp>
-            <p:nvSpPr>
-              <p:cNvPr id="7" name="TextBox 113">
-                <a:extLst>
-                  <a:ext uri="{FF2B5EF4-FFF2-40B4-BE49-F238E27FC236}">
-                    <a16:creationId xmlns:a16="http://schemas.microsoft.com/office/drawing/2014/main" id="{29E1EE90-C7F3-3FD2-A12C-3FB129F5CBFD}"/>
-                  </a:ext>
-                </a:extLst>
-              </p:cNvPr>
-              <p:cNvSpPr txBox="1"/>
-              <p:nvPr/>
-            </p:nvSpPr>
-            <p:spPr>
-              <a:xfrm>
-                <a:off x="1509381" y="508403"/>
-                <a:ext cx="1707840" cy="738664"/>
-              </a:xfrm>
-              <a:prstGeom prst="rect">
-                <a:avLst/>
-              </a:prstGeom>
-              <a:noFill/>
-            </p:spPr>
-            <p:txBody>
-              <a:bodyPr wrap="none" rtlCol="0">
-                <a:spAutoFit/>
-              </a:bodyPr>
-              <a:lstStyle/>
-              <a:p>
-                <a:r>
-                  <a:rPr lang="fr-FR" sz="1400" dirty="0"/>
-                  <a:t>To USB slave</a:t>
-                </a:r>
-                <a:br>
-                  <a:rPr lang="fr-FR" sz="1400" dirty="0"/>
-                </a:br>
-                <a:r>
-                  <a:rPr lang="fr-FR" sz="1400" dirty="0" err="1"/>
-                  <a:t>device</a:t>
-                </a:r>
-                <a:br>
-                  <a:rPr lang="fr-FR" sz="1400" dirty="0"/>
-                </a:br>
-                <a:r>
-                  <a:rPr lang="fr-FR" sz="1400" dirty="0"/>
-                  <a:t>(</a:t>
-                </a:r>
-                <a:r>
-                  <a:rPr lang="fr-FR" sz="1400" dirty="0" err="1"/>
-                  <a:t>eg</a:t>
-                </a:r>
-                <a:r>
-                  <a:rPr lang="fr-FR" sz="1400" dirty="0"/>
-                  <a:t>. Novation circuit)</a:t>
-                </a:r>
-              </a:p>
-            </p:txBody>
-          </p:sp>
-          <p:sp>
-            <p:nvSpPr>
-              <p:cNvPr id="104" name="Oval 103">
-                <a:extLst>
-                  <a:ext uri="{FF2B5EF4-FFF2-40B4-BE49-F238E27FC236}">
-                    <a16:creationId xmlns:a16="http://schemas.microsoft.com/office/drawing/2014/main" id="{95265241-7F96-6AE5-5508-0E788C9D91B8}"/>
-                  </a:ext>
-                </a:extLst>
-              </p:cNvPr>
-              <p:cNvSpPr/>
-              <p:nvPr/>
-            </p:nvSpPr>
-            <p:spPr>
-              <a:xfrm>
-                <a:off x="4591879" y="518820"/>
-                <a:ext cx="779228" cy="779228"/>
-              </a:xfrm>
-              <a:prstGeom prst="ellipse">
-                <a:avLst/>
-              </a:prstGeom>
-              <a:noFill/>
-            </p:spPr>
-            <p:style>
-              <a:lnRef idx="2">
-                <a:schemeClr val="accent1">
-                  <a:shade val="15000"/>
-                </a:schemeClr>
-              </a:lnRef>
-              <a:fillRef idx="1">
-                <a:schemeClr val="accent1"/>
-              </a:fillRef>
-              <a:effectRef idx="0">
-                <a:schemeClr val="accent1"/>
-              </a:effectRef>
-              <a:fontRef idx="minor">
-                <a:schemeClr val="lt1"/>
-              </a:fontRef>
-            </p:style>
-            <p:txBody>
-              <a:bodyPr rtlCol="0" anchor="ctr"/>
-              <a:lstStyle/>
-              <a:p>
-                <a:pPr algn="ctr"/>
-                <a:r>
-                  <a:rPr lang="fr-FR" sz="800" dirty="0">
-                    <a:solidFill>
-                      <a:schemeClr val="tx1"/>
-                    </a:solidFill>
-                  </a:rPr>
-                  <a:t>CONTINUE</a:t>
-                </a:r>
-                <a:endParaRPr lang="en-GB" sz="800" dirty="0">
+              </a:endParaRPr>
+            </a:p>
+          </p:txBody>
+        </p:sp>
+        <p:sp>
+          <p:nvSpPr>
+            <p:cNvPr id="105" name="Oval 104">
+              <a:extLst>
+                <a:ext uri="{FF2B5EF4-FFF2-40B4-BE49-F238E27FC236}">
+                  <a16:creationId xmlns:a16="http://schemas.microsoft.com/office/drawing/2014/main" id="{BDD75742-CE75-8D1A-B77E-91F42575F968}"/>
+                </a:ext>
+              </a:extLst>
+            </p:cNvPr>
+            <p:cNvSpPr/>
+            <p:nvPr/>
+          </p:nvSpPr>
+          <p:spPr>
+            <a:xfrm>
+              <a:off x="3480022" y="518820"/>
+              <a:ext cx="779228" cy="779228"/>
+            </a:xfrm>
+            <a:prstGeom prst="ellipse">
+              <a:avLst/>
+            </a:prstGeom>
+            <a:noFill/>
+          </p:spPr>
+          <p:style>
+            <a:lnRef idx="2">
+              <a:schemeClr val="accent1">
+                <a:shade val="15000"/>
+              </a:schemeClr>
+            </a:lnRef>
+            <a:fillRef idx="1">
+              <a:schemeClr val="accent1"/>
+            </a:fillRef>
+            <a:effectRef idx="0">
+              <a:schemeClr val="accent1"/>
+            </a:effectRef>
+            <a:fontRef idx="minor">
+              <a:schemeClr val="lt1"/>
+            </a:fontRef>
+          </p:style>
+          <p:txBody>
+            <a:bodyPr rtlCol="0" anchor="ctr"/>
+            <a:lstStyle/>
+            <a:p>
+              <a:pPr algn="ctr"/>
+              <a:r>
+                <a:rPr lang="fr-FR" sz="800" dirty="0" err="1">
                   <a:solidFill>
                     <a:schemeClr val="tx1"/>
                   </a:solidFill>
-                </a:endParaRPr>
-              </a:p>
-            </p:txBody>
-          </p:sp>
-          <p:sp>
-            <p:nvSpPr>
-              <p:cNvPr id="105" name="Oval 104">
-                <a:extLst>
-                  <a:ext uri="{FF2B5EF4-FFF2-40B4-BE49-F238E27FC236}">
-                    <a16:creationId xmlns:a16="http://schemas.microsoft.com/office/drawing/2014/main" id="{BDD75742-CE75-8D1A-B77E-91F42575F968}"/>
-                  </a:ext>
-                </a:extLst>
-              </p:cNvPr>
-              <p:cNvSpPr/>
-              <p:nvPr/>
-            </p:nvSpPr>
-            <p:spPr>
-              <a:xfrm>
-                <a:off x="3480022" y="518820"/>
-                <a:ext cx="779228" cy="779228"/>
-              </a:xfrm>
-              <a:prstGeom prst="ellipse">
-                <a:avLst/>
-              </a:prstGeom>
-              <a:noFill/>
-            </p:spPr>
-            <p:style>
-              <a:lnRef idx="2">
-                <a:schemeClr val="accent1">
-                  <a:shade val="15000"/>
-                </a:schemeClr>
-              </a:lnRef>
-              <a:fillRef idx="1">
-                <a:schemeClr val="accent1"/>
-              </a:fillRef>
-              <a:effectRef idx="0">
-                <a:schemeClr val="accent1"/>
-              </a:effectRef>
-              <a:fontRef idx="minor">
-                <a:schemeClr val="lt1"/>
-              </a:fontRef>
-            </p:style>
-            <p:txBody>
-              <a:bodyPr rtlCol="0" anchor="ctr"/>
-              <a:lstStyle/>
-              <a:p>
-                <a:pPr algn="ctr"/>
-                <a:r>
-                  <a:rPr lang="fr-FR" sz="800" dirty="0" err="1">
-                    <a:solidFill>
-                      <a:schemeClr val="tx1"/>
-                    </a:solidFill>
-                  </a:rPr>
-                  <a:t>Previous</a:t>
-                </a:r>
-                <a:br>
-                  <a:rPr lang="fr-FR" sz="800" dirty="0">
-                    <a:solidFill>
-                      <a:schemeClr val="tx1"/>
-                    </a:solidFill>
-                  </a:rPr>
-                </a:br>
-                <a:r>
-                  <a:rPr lang="fr-FR" sz="800" dirty="0">
-                    <a:solidFill>
-                      <a:schemeClr val="tx1"/>
-                    </a:solidFill>
-                  </a:rPr>
-                  <a:t>session</a:t>
-                </a:r>
-                <a:endParaRPr lang="en-GB" sz="800" dirty="0">
+                </a:rPr>
+                <a:t>Previous</a:t>
+              </a:r>
+              <a:br>
+                <a:rPr lang="fr-FR" sz="800" dirty="0">
                   <a:solidFill>
                     <a:schemeClr val="tx1"/>
                   </a:solidFill>
-                </a:endParaRPr>
-              </a:p>
-            </p:txBody>
-          </p:sp>
-          <p:sp>
-            <p:nvSpPr>
-              <p:cNvPr id="106" name="Oval 105">
-                <a:extLst>
-                  <a:ext uri="{FF2B5EF4-FFF2-40B4-BE49-F238E27FC236}">
-                    <a16:creationId xmlns:a16="http://schemas.microsoft.com/office/drawing/2014/main" id="{4586708E-F997-387D-B42A-B894A4F74F9C}"/>
-                  </a:ext>
-                </a:extLst>
-              </p:cNvPr>
-              <p:cNvSpPr/>
-              <p:nvPr/>
-            </p:nvSpPr>
-            <p:spPr>
-              <a:xfrm>
-                <a:off x="5703736" y="518820"/>
-                <a:ext cx="779228" cy="779228"/>
-              </a:xfrm>
-              <a:prstGeom prst="ellipse">
-                <a:avLst/>
-              </a:prstGeom>
-              <a:noFill/>
-            </p:spPr>
-            <p:style>
-              <a:lnRef idx="2">
-                <a:schemeClr val="accent1">
-                  <a:shade val="15000"/>
-                </a:schemeClr>
-              </a:lnRef>
-              <a:fillRef idx="1">
-                <a:schemeClr val="accent1"/>
-              </a:fillRef>
-              <a:effectRef idx="0">
-                <a:schemeClr val="accent1"/>
-              </a:effectRef>
-              <a:fontRef idx="minor">
-                <a:schemeClr val="lt1"/>
-              </a:fontRef>
-            </p:style>
-            <p:txBody>
-              <a:bodyPr rtlCol="0" anchor="ctr"/>
-              <a:lstStyle/>
-              <a:p>
-                <a:pPr algn="ctr"/>
-                <a:r>
-                  <a:rPr lang="fr-FR" sz="800" dirty="0">
-                    <a:solidFill>
-                      <a:schemeClr val="tx1"/>
-                    </a:solidFill>
-                  </a:rPr>
-                  <a:t>PLAY</a:t>
-                </a:r>
-                <a:endParaRPr lang="en-GB" sz="800" dirty="0">
+                </a:rPr>
+              </a:br>
+              <a:r>
+                <a:rPr lang="fr-FR" sz="800" dirty="0">
                   <a:solidFill>
                     <a:schemeClr val="tx1"/>
                   </a:solidFill>
-                </a:endParaRPr>
-              </a:p>
-            </p:txBody>
-          </p:sp>
-          <p:sp>
-            <p:nvSpPr>
-              <p:cNvPr id="107" name="Oval 106">
-                <a:extLst>
-                  <a:ext uri="{FF2B5EF4-FFF2-40B4-BE49-F238E27FC236}">
-                    <a16:creationId xmlns:a16="http://schemas.microsoft.com/office/drawing/2014/main" id="{F0F4331F-529A-D377-48E7-FA6EB103E6DA}"/>
-                  </a:ext>
-                </a:extLst>
-              </p:cNvPr>
-              <p:cNvSpPr/>
-              <p:nvPr/>
-            </p:nvSpPr>
-            <p:spPr>
-              <a:xfrm>
-                <a:off x="6815593" y="518820"/>
-                <a:ext cx="779228" cy="779228"/>
-              </a:xfrm>
-              <a:prstGeom prst="ellipse">
-                <a:avLst/>
-              </a:prstGeom>
-              <a:noFill/>
-            </p:spPr>
-            <p:style>
-              <a:lnRef idx="2">
-                <a:schemeClr val="accent1">
-                  <a:shade val="15000"/>
-                </a:schemeClr>
-              </a:lnRef>
-              <a:fillRef idx="1">
-                <a:schemeClr val="accent1"/>
-              </a:fillRef>
-              <a:effectRef idx="0">
-                <a:schemeClr val="accent1"/>
-              </a:effectRef>
-              <a:fontRef idx="minor">
-                <a:schemeClr val="lt1"/>
-              </a:fontRef>
-            </p:style>
-            <p:txBody>
-              <a:bodyPr rtlCol="0" anchor="ctr"/>
-              <a:lstStyle/>
-              <a:p>
-                <a:pPr algn="ctr"/>
-                <a:r>
-                  <a:rPr lang="fr-FR" sz="800" dirty="0">
-                    <a:solidFill>
-                      <a:schemeClr val="tx1"/>
-                    </a:solidFill>
-                  </a:rPr>
-                  <a:t>TAP TEMPO</a:t>
-                </a:r>
-                <a:endParaRPr lang="en-GB" sz="800" dirty="0">
+                </a:rPr>
+                <a:t>session</a:t>
+              </a:r>
+              <a:endParaRPr lang="en-GB" sz="800" dirty="0">
+                <a:solidFill>
+                  <a:schemeClr val="tx1"/>
+                </a:solidFill>
+              </a:endParaRPr>
+            </a:p>
+          </p:txBody>
+        </p:sp>
+        <p:sp>
+          <p:nvSpPr>
+            <p:cNvPr id="106" name="Oval 105">
+              <a:extLst>
+                <a:ext uri="{FF2B5EF4-FFF2-40B4-BE49-F238E27FC236}">
+                  <a16:creationId xmlns:a16="http://schemas.microsoft.com/office/drawing/2014/main" id="{4586708E-F997-387D-B42A-B894A4F74F9C}"/>
+                </a:ext>
+              </a:extLst>
+            </p:cNvPr>
+            <p:cNvSpPr/>
+            <p:nvPr/>
+          </p:nvSpPr>
+          <p:spPr>
+            <a:xfrm>
+              <a:off x="5703736" y="518820"/>
+              <a:ext cx="779228" cy="779228"/>
+            </a:xfrm>
+            <a:prstGeom prst="ellipse">
+              <a:avLst/>
+            </a:prstGeom>
+            <a:noFill/>
+          </p:spPr>
+          <p:style>
+            <a:lnRef idx="2">
+              <a:schemeClr val="accent1">
+                <a:shade val="15000"/>
+              </a:schemeClr>
+            </a:lnRef>
+            <a:fillRef idx="1">
+              <a:schemeClr val="accent1"/>
+            </a:fillRef>
+            <a:effectRef idx="0">
+              <a:schemeClr val="accent1"/>
+            </a:effectRef>
+            <a:fontRef idx="minor">
+              <a:schemeClr val="lt1"/>
+            </a:fontRef>
+          </p:style>
+          <p:txBody>
+            <a:bodyPr rtlCol="0" anchor="ctr"/>
+            <a:lstStyle/>
+            <a:p>
+              <a:pPr algn="ctr"/>
+              <a:r>
+                <a:rPr lang="fr-FR" sz="800" dirty="0">
                   <a:solidFill>
                     <a:schemeClr val="tx1"/>
                   </a:solidFill>
-                </a:endParaRPr>
-              </a:p>
-            </p:txBody>
-          </p:sp>
-          <p:sp>
-            <p:nvSpPr>
-              <p:cNvPr id="108" name="Oval 107">
-                <a:extLst>
-                  <a:ext uri="{FF2B5EF4-FFF2-40B4-BE49-F238E27FC236}">
-                    <a16:creationId xmlns:a16="http://schemas.microsoft.com/office/drawing/2014/main" id="{FAD555BF-D423-E830-4B72-5ADC4922B79E}"/>
-                  </a:ext>
-                </a:extLst>
-              </p:cNvPr>
-              <p:cNvSpPr/>
-              <p:nvPr/>
-            </p:nvSpPr>
-            <p:spPr>
-              <a:xfrm>
-                <a:off x="7927451" y="518820"/>
-                <a:ext cx="779228" cy="779228"/>
-              </a:xfrm>
-              <a:prstGeom prst="ellipse">
-                <a:avLst/>
-              </a:prstGeom>
-              <a:noFill/>
-            </p:spPr>
-            <p:style>
-              <a:lnRef idx="2">
-                <a:schemeClr val="accent1">
-                  <a:shade val="15000"/>
-                </a:schemeClr>
-              </a:lnRef>
-              <a:fillRef idx="1">
-                <a:schemeClr val="accent1"/>
-              </a:fillRef>
-              <a:effectRef idx="0">
-                <a:schemeClr val="accent1"/>
-              </a:effectRef>
-              <a:fontRef idx="minor">
-                <a:schemeClr val="lt1"/>
-              </a:fontRef>
-            </p:style>
-            <p:txBody>
-              <a:bodyPr rtlCol="0" anchor="ctr"/>
-              <a:lstStyle/>
-              <a:p>
-                <a:pPr algn="ctr"/>
-                <a:r>
-                  <a:rPr lang="fr-FR" sz="800" dirty="0">
-                    <a:solidFill>
-                      <a:schemeClr val="tx1"/>
-                    </a:solidFill>
-                  </a:rPr>
-                  <a:t>Next</a:t>
-                </a:r>
-                <a:br>
-                  <a:rPr lang="fr-FR" sz="800" dirty="0">
-                    <a:solidFill>
-                      <a:schemeClr val="tx1"/>
-                    </a:solidFill>
-                  </a:rPr>
-                </a:br>
-                <a:r>
-                  <a:rPr lang="fr-FR" sz="800" dirty="0">
-                    <a:solidFill>
-                      <a:schemeClr val="tx1"/>
-                    </a:solidFill>
-                  </a:rPr>
-                  <a:t>session</a:t>
-                </a:r>
-                <a:endParaRPr lang="en-GB" sz="800" dirty="0">
+                </a:rPr>
+                <a:t>TAP TEMPO</a:t>
+              </a:r>
+              <a:endParaRPr lang="en-GB" sz="800" dirty="0">
+                <a:solidFill>
+                  <a:schemeClr val="tx1"/>
+                </a:solidFill>
+              </a:endParaRPr>
+            </a:p>
+          </p:txBody>
+        </p:sp>
+        <p:sp>
+          <p:nvSpPr>
+            <p:cNvPr id="107" name="Oval 106">
+              <a:extLst>
+                <a:ext uri="{FF2B5EF4-FFF2-40B4-BE49-F238E27FC236}">
+                  <a16:creationId xmlns:a16="http://schemas.microsoft.com/office/drawing/2014/main" id="{F0F4331F-529A-D377-48E7-FA6EB103E6DA}"/>
+                </a:ext>
+              </a:extLst>
+            </p:cNvPr>
+            <p:cNvSpPr/>
+            <p:nvPr/>
+          </p:nvSpPr>
+          <p:spPr>
+            <a:xfrm>
+              <a:off x="6815593" y="518820"/>
+              <a:ext cx="779228" cy="779228"/>
+            </a:xfrm>
+            <a:prstGeom prst="ellipse">
+              <a:avLst/>
+            </a:prstGeom>
+            <a:noFill/>
+          </p:spPr>
+          <p:style>
+            <a:lnRef idx="2">
+              <a:schemeClr val="accent1">
+                <a:shade val="15000"/>
+              </a:schemeClr>
+            </a:lnRef>
+            <a:fillRef idx="1">
+              <a:schemeClr val="accent1"/>
+            </a:fillRef>
+            <a:effectRef idx="0">
+              <a:schemeClr val="accent1"/>
+            </a:effectRef>
+            <a:fontRef idx="minor">
+              <a:schemeClr val="lt1"/>
+            </a:fontRef>
+          </p:style>
+          <p:txBody>
+            <a:bodyPr rtlCol="0" anchor="ctr"/>
+            <a:lstStyle/>
+            <a:p>
+              <a:pPr algn="ctr"/>
+              <a:r>
+                <a:rPr lang="fr-FR" sz="800" dirty="0">
                   <a:solidFill>
                     <a:schemeClr val="tx1"/>
                   </a:solidFill>
-                </a:endParaRPr>
-              </a:p>
-            </p:txBody>
-          </p:sp>
-        </p:grpSp>
+                </a:rPr>
+                <a:t>PLAY / STOP</a:t>
+              </a:r>
+              <a:endParaRPr lang="en-GB" sz="800" dirty="0">
+                <a:solidFill>
+                  <a:schemeClr val="tx1"/>
+                </a:solidFill>
+              </a:endParaRPr>
+            </a:p>
+          </p:txBody>
+        </p:sp>
+        <p:sp>
+          <p:nvSpPr>
+            <p:cNvPr id="108" name="Oval 107">
+              <a:extLst>
+                <a:ext uri="{FF2B5EF4-FFF2-40B4-BE49-F238E27FC236}">
+                  <a16:creationId xmlns:a16="http://schemas.microsoft.com/office/drawing/2014/main" id="{FAD555BF-D423-E830-4B72-5ADC4922B79E}"/>
+                </a:ext>
+              </a:extLst>
+            </p:cNvPr>
+            <p:cNvSpPr/>
+            <p:nvPr/>
+          </p:nvSpPr>
+          <p:spPr>
+            <a:xfrm>
+              <a:off x="7927451" y="518820"/>
+              <a:ext cx="779228" cy="779228"/>
+            </a:xfrm>
+            <a:prstGeom prst="ellipse">
+              <a:avLst/>
+            </a:prstGeom>
+            <a:noFill/>
+          </p:spPr>
+          <p:style>
+            <a:lnRef idx="2">
+              <a:schemeClr val="accent1">
+                <a:shade val="15000"/>
+              </a:schemeClr>
+            </a:lnRef>
+            <a:fillRef idx="1">
+              <a:schemeClr val="accent1"/>
+            </a:fillRef>
+            <a:effectRef idx="0">
+              <a:schemeClr val="accent1"/>
+            </a:effectRef>
+            <a:fontRef idx="minor">
+              <a:schemeClr val="lt1"/>
+            </a:fontRef>
+          </p:style>
+          <p:txBody>
+            <a:bodyPr rtlCol="0" anchor="ctr"/>
+            <a:lstStyle/>
+            <a:p>
+              <a:pPr algn="ctr"/>
+              <a:r>
+                <a:rPr lang="fr-FR" sz="800" dirty="0">
+                  <a:solidFill>
+                    <a:schemeClr val="tx1"/>
+                  </a:solidFill>
+                </a:rPr>
+                <a:t>Next</a:t>
+              </a:r>
+              <a:br>
+                <a:rPr lang="fr-FR" sz="800" dirty="0">
+                  <a:solidFill>
+                    <a:schemeClr val="tx1"/>
+                  </a:solidFill>
+                </a:rPr>
+              </a:br>
+              <a:r>
+                <a:rPr lang="fr-FR" sz="800" dirty="0">
+                  <a:solidFill>
+                    <a:schemeClr val="tx1"/>
+                  </a:solidFill>
+                </a:rPr>
+                <a:t>session</a:t>
+              </a:r>
+              <a:endParaRPr lang="en-GB" sz="800" dirty="0">
+                <a:solidFill>
+                  <a:schemeClr val="tx1"/>
+                </a:solidFill>
+              </a:endParaRPr>
+            </a:p>
+          </p:txBody>
+        </p:sp>
+      </p:grpSp>
+      <p:grpSp>
+        <p:nvGrpSpPr>
+          <p:cNvPr id="11" name="Group 10">
+            <a:extLst>
+              <a:ext uri="{FF2B5EF4-FFF2-40B4-BE49-F238E27FC236}">
+                <a16:creationId xmlns:a16="http://schemas.microsoft.com/office/drawing/2014/main" id="{535528E7-DD41-99DF-9E89-D2B5AB4EA38D}"/>
+              </a:ext>
+            </a:extLst>
+          </p:cNvPr>
+          <p:cNvGrpSpPr/>
+          <p:nvPr/>
+        </p:nvGrpSpPr>
+        <p:grpSpPr>
+          <a:xfrm>
+            <a:off x="1509381" y="1875009"/>
+            <a:ext cx="7396079" cy="3107982"/>
+            <a:chOff x="1509381" y="1875009"/>
+            <a:chExt cx="7396079" cy="3107982"/>
+          </a:xfrm>
+        </p:grpSpPr>
         <p:sp>
           <p:nvSpPr>
             <p:cNvPr id="110" name="Rectangle 109">

</xml_diff>